<commit_message>
[Tutorial] 튜토리얼 metformin DM
</commit_message>
<xml_diff>
--- a/튜토리얼 ppt 0722_DM ver..pptx
+++ b/튜토리얼 ppt 0722_DM ver..pptx
@@ -5208,8 +5208,8 @@
         </p:nvSpPr>
         <p:spPr>
           <a:xfrm>
-            <a:off x="863055" y="5216928"/>
-            <a:ext cx="10338839" cy="1025868"/>
+            <a:off x="2733964" y="5216928"/>
+            <a:ext cx="8467930" cy="1025868"/>
           </a:xfrm>
           <a:prstGeom prst="rect">
             <a:avLst/>
@@ -5664,38 +5664,9 @@
           <a:chExt cx="0" cy="0"/>
         </a:xfrm>
       </p:grpSpPr>
-      <p:sp>
-        <p:nvSpPr>
-          <p:cNvPr id="2" name="슬라이드 번호 개체 틀 1">
-            <a:extLst>
-              <a:ext uri="{FF2B5EF4-FFF2-40B4-BE49-F238E27FC236}">
-                <a16:creationId xmlns:a16="http://schemas.microsoft.com/office/drawing/2014/main" id="{23368F47-15BC-400F-B239-B9EC1F3B208E}"/>
-              </a:ext>
-            </a:extLst>
-          </p:cNvPr>
-          <p:cNvSpPr>
-            <a:spLocks noGrp="1"/>
-          </p:cNvSpPr>
-          <p:nvPr>
-            <p:ph type="sldNum" sz="quarter" idx="12"/>
-          </p:nvPr>
-        </p:nvSpPr>
-        <p:spPr/>
-        <p:txBody>
-          <a:bodyPr/>
-          <a:lstStyle/>
-          <a:p>
-            <a:fld id="{E887A479-1FB4-4076-82AD-4520E3445CF4}" type="slidenum">
-              <a:rPr lang="ko-KR" altLang="en-US" smtClean="0"/>
-              <a:t>16</a:t>
-            </a:fld>
-            <a:endParaRPr lang="ko-KR" altLang="en-US"/>
-          </a:p>
-        </p:txBody>
-      </p:sp>
       <p:pic>
         <p:nvPicPr>
-          <p:cNvPr id="3" name="그림 2"/>
+          <p:cNvPr id="8" name="그림 7"/>
           <p:cNvPicPr>
             <a:picLocks noChangeAspect="1"/>
           </p:cNvPicPr>
@@ -5709,8 +5680,8 @@
         </p:blipFill>
         <p:spPr>
           <a:xfrm>
-            <a:off x="799927" y="153982"/>
-            <a:ext cx="8410575" cy="4724400"/>
+            <a:off x="772506" y="5051425"/>
+            <a:ext cx="10401300" cy="1304925"/>
           </a:xfrm>
           <a:prstGeom prst="rect">
             <a:avLst/>
@@ -5719,6 +5690,59 @@
       </p:pic>
       <p:sp>
         <p:nvSpPr>
+          <p:cNvPr id="2" name="슬라이드 번호 개체 틀 1">
+            <a:extLst>
+              <a:ext uri="{FF2B5EF4-FFF2-40B4-BE49-F238E27FC236}">
+                <a16:creationId xmlns:a16="http://schemas.microsoft.com/office/drawing/2014/main" id="{23368F47-15BC-400F-B239-B9EC1F3B208E}"/>
+              </a:ext>
+            </a:extLst>
+          </p:cNvPr>
+          <p:cNvSpPr>
+            <a:spLocks noGrp="1"/>
+          </p:cNvSpPr>
+          <p:nvPr>
+            <p:ph type="sldNum" sz="quarter" idx="12"/>
+          </p:nvPr>
+        </p:nvSpPr>
+        <p:spPr/>
+        <p:txBody>
+          <a:bodyPr/>
+          <a:lstStyle/>
+          <a:p>
+            <a:fld id="{E887A479-1FB4-4076-82AD-4520E3445CF4}" type="slidenum">
+              <a:rPr lang="ko-KR" altLang="en-US" smtClean="0"/>
+              <a:t>16</a:t>
+            </a:fld>
+            <a:endParaRPr lang="ko-KR" altLang="en-US"/>
+          </a:p>
+        </p:txBody>
+      </p:sp>
+      <p:pic>
+        <p:nvPicPr>
+          <p:cNvPr id="3" name="그림 2"/>
+          <p:cNvPicPr>
+            <a:picLocks noChangeAspect="1"/>
+          </p:cNvPicPr>
+          <p:nvPr/>
+        </p:nvPicPr>
+        <p:blipFill>
+          <a:blip r:embed="rId3"/>
+          <a:stretch>
+            <a:fillRect/>
+          </a:stretch>
+        </p:blipFill>
+        <p:spPr>
+          <a:xfrm>
+            <a:off x="799927" y="153982"/>
+            <a:ext cx="8410575" cy="4724400"/>
+          </a:xfrm>
+          <a:prstGeom prst="rect">
+            <a:avLst/>
+          </a:prstGeom>
+        </p:spPr>
+      </p:pic>
+      <p:sp>
+        <p:nvSpPr>
           <p:cNvPr id="6" name="직사각형 5">
             <a:extLst>
               <a:ext uri="{FF2B5EF4-FFF2-40B4-BE49-F238E27FC236}">
@@ -5731,8 +5755,8 @@
         </p:nvSpPr>
         <p:spPr>
           <a:xfrm>
-            <a:off x="700174" y="5371038"/>
-            <a:ext cx="10545965" cy="985312"/>
+            <a:off x="2669309" y="5588000"/>
+            <a:ext cx="8576830" cy="768350"/>
           </a:xfrm>
           <a:prstGeom prst="rect">
             <a:avLst/>
@@ -10756,6 +10780,54 @@
           <a:chExt cx="0" cy="0"/>
         </a:xfrm>
       </p:grpSpPr>
+      <p:pic>
+        <p:nvPicPr>
+          <p:cNvPr id="8" name="그림 7"/>
+          <p:cNvPicPr>
+            <a:picLocks noChangeAspect="1"/>
+          </p:cNvPicPr>
+          <p:nvPr/>
+        </p:nvPicPr>
+        <p:blipFill>
+          <a:blip r:embed="rId2"/>
+          <a:stretch>
+            <a:fillRect/>
+          </a:stretch>
+        </p:blipFill>
+        <p:spPr>
+          <a:xfrm>
+            <a:off x="1005840" y="4420077"/>
+            <a:ext cx="8477250" cy="2118835"/>
+          </a:xfrm>
+          <a:prstGeom prst="rect">
+            <a:avLst/>
+          </a:prstGeom>
+        </p:spPr>
+      </p:pic>
+      <p:pic>
+        <p:nvPicPr>
+          <p:cNvPr id="11" name="그림 10"/>
+          <p:cNvPicPr>
+            <a:picLocks noChangeAspect="1"/>
+          </p:cNvPicPr>
+          <p:nvPr/>
+        </p:nvPicPr>
+        <p:blipFill>
+          <a:blip r:embed="rId3"/>
+          <a:stretch>
+            <a:fillRect/>
+          </a:stretch>
+        </p:blipFill>
+        <p:spPr>
+          <a:xfrm>
+            <a:off x="1005840" y="1957955"/>
+            <a:ext cx="8477250" cy="2305050"/>
+          </a:xfrm>
+          <a:prstGeom prst="rect">
+            <a:avLst/>
+          </a:prstGeom>
+        </p:spPr>
+      </p:pic>
       <p:cxnSp>
         <p:nvCxnSpPr>
           <p:cNvPr id="4" name="직선 연결선 3">
@@ -10897,13 +10969,13 @@
           <a:p>
             <a:r>
               <a:rPr lang="en-US" altLang="ko-KR" sz="2400" dirty="0">
-                <a:hlinkClick r:id="rId2"/>
+                <a:hlinkClick r:id="rId4"/>
               </a:rPr>
               <a:t>https://</a:t>
             </a:r>
             <a:r>
               <a:rPr lang="en-US" altLang="ko-KR" sz="2400" dirty="0" smtClean="0">
-                <a:hlinkClick r:id="rId2"/>
+                <a:hlinkClick r:id="rId4"/>
               </a:rPr>
               <a:t>github.com/rlawodud3920/CDM</a:t>
             </a:r>
@@ -10911,54 +10983,6 @@
           </a:p>
         </p:txBody>
       </p:sp>
-      <p:pic>
-        <p:nvPicPr>
-          <p:cNvPr id="5" name="그림 4"/>
-          <p:cNvPicPr>
-            <a:picLocks noChangeAspect="1"/>
-          </p:cNvPicPr>
-          <p:nvPr/>
-        </p:nvPicPr>
-        <p:blipFill>
-          <a:blip r:embed="rId3"/>
-          <a:stretch>
-            <a:fillRect/>
-          </a:stretch>
-        </p:blipFill>
-        <p:spPr>
-          <a:xfrm>
-            <a:off x="1005840" y="2200882"/>
-            <a:ext cx="8601075" cy="1638300"/>
-          </a:xfrm>
-          <a:prstGeom prst="rect">
-            <a:avLst/>
-          </a:prstGeom>
-        </p:spPr>
-      </p:pic>
-      <p:pic>
-        <p:nvPicPr>
-          <p:cNvPr id="7" name="그림 6"/>
-          <p:cNvPicPr>
-            <a:picLocks noChangeAspect="1"/>
-          </p:cNvPicPr>
-          <p:nvPr/>
-        </p:nvPicPr>
-        <p:blipFill>
-          <a:blip r:embed="rId4"/>
-          <a:stretch>
-            <a:fillRect/>
-          </a:stretch>
-        </p:blipFill>
-        <p:spPr>
-          <a:xfrm>
-            <a:off x="1005840" y="4004329"/>
-            <a:ext cx="8077114" cy="2186874"/>
-          </a:xfrm>
-          <a:prstGeom prst="rect">
-            <a:avLst/>
-          </a:prstGeom>
-        </p:spPr>
-      </p:pic>
       <p:sp>
         <p:nvSpPr>
           <p:cNvPr id="9" name="직사각형 8"/>
@@ -10967,8 +10991,8 @@
         </p:nvSpPr>
         <p:spPr>
           <a:xfrm>
-            <a:off x="1005840" y="3438206"/>
-            <a:ext cx="2211185" cy="397713"/>
+            <a:off x="1098203" y="3865748"/>
+            <a:ext cx="2346961" cy="397713"/>
           </a:xfrm>
           <a:prstGeom prst="rect">
             <a:avLst/>
@@ -11013,7 +11037,7 @@
         </p:nvSpPr>
         <p:spPr>
           <a:xfrm>
-            <a:off x="7767783" y="5219230"/>
+            <a:off x="8253082" y="5671811"/>
             <a:ext cx="715036" cy="276249"/>
           </a:xfrm>
           <a:prstGeom prst="rect">
@@ -13152,7 +13176,7 @@
       </p:grpSpPr>
       <p:pic>
         <p:nvPicPr>
-          <p:cNvPr id="8" name="그림 7"/>
+          <p:cNvPr id="11" name="그림 10"/>
           <p:cNvPicPr>
             <a:picLocks noChangeAspect="1"/>
           </p:cNvPicPr>
@@ -13166,8 +13190,32 @@
         </p:blipFill>
         <p:spPr>
           <a:xfrm>
-            <a:off x="1005840" y="4122388"/>
-            <a:ext cx="8601075" cy="1610927"/>
+            <a:off x="1005840" y="4301213"/>
+            <a:ext cx="8477250" cy="1576032"/>
+          </a:xfrm>
+          <a:prstGeom prst="rect">
+            <a:avLst/>
+          </a:prstGeom>
+        </p:spPr>
+      </p:pic>
+      <p:pic>
+        <p:nvPicPr>
+          <p:cNvPr id="7" name="그림 6"/>
+          <p:cNvPicPr>
+            <a:picLocks noChangeAspect="1"/>
+          </p:cNvPicPr>
+          <p:nvPr/>
+        </p:nvPicPr>
+        <p:blipFill>
+          <a:blip r:embed="rId3"/>
+          <a:stretch>
+            <a:fillRect/>
+          </a:stretch>
+        </p:blipFill>
+        <p:spPr>
+          <a:xfrm>
+            <a:off x="1005840" y="1931497"/>
+            <a:ext cx="8477250" cy="2305050"/>
           </a:xfrm>
           <a:prstGeom prst="rect">
             <a:avLst/>
@@ -13315,13 +13363,13 @@
           <a:p>
             <a:r>
               <a:rPr lang="en-US" altLang="ko-KR" sz="2400" dirty="0">
-                <a:hlinkClick r:id="rId3"/>
+                <a:hlinkClick r:id="rId4"/>
               </a:rPr>
               <a:t>https://</a:t>
             </a:r>
             <a:r>
               <a:rPr lang="en-US" altLang="ko-KR" sz="2400" dirty="0" smtClean="0">
-                <a:hlinkClick r:id="rId3"/>
+                <a:hlinkClick r:id="rId4"/>
               </a:rPr>
               <a:t>github.com/rlawodud3920/CDM</a:t>
             </a:r>
@@ -13329,30 +13377,6 @@
           </a:p>
         </p:txBody>
       </p:sp>
-      <p:pic>
-        <p:nvPicPr>
-          <p:cNvPr id="5" name="그림 4"/>
-          <p:cNvPicPr>
-            <a:picLocks noChangeAspect="1"/>
-          </p:cNvPicPr>
-          <p:nvPr/>
-        </p:nvPicPr>
-        <p:blipFill>
-          <a:blip r:embed="rId4"/>
-          <a:stretch>
-            <a:fillRect/>
-          </a:stretch>
-        </p:blipFill>
-        <p:spPr>
-          <a:xfrm>
-            <a:off x="1005840" y="2189333"/>
-            <a:ext cx="8601075" cy="1638300"/>
-          </a:xfrm>
-          <a:prstGeom prst="rect">
-            <a:avLst/>
-          </a:prstGeom>
-        </p:spPr>
-      </p:pic>
       <p:sp>
         <p:nvSpPr>
           <p:cNvPr id="9" name="직사각형 8"/>
@@ -13361,7 +13385,7 @@
         </p:nvSpPr>
         <p:spPr>
           <a:xfrm>
-            <a:off x="1005840" y="2701637"/>
+            <a:off x="1005840" y="2446455"/>
             <a:ext cx="2211185" cy="382385"/>
           </a:xfrm>
           <a:prstGeom prst="rect">
@@ -13407,8 +13431,8 @@
         </p:nvSpPr>
         <p:spPr>
           <a:xfrm>
-            <a:off x="8395854" y="5037513"/>
-            <a:ext cx="668855" cy="319841"/>
+            <a:off x="8301181" y="5198736"/>
+            <a:ext cx="618837" cy="323536"/>
           </a:xfrm>
           <a:prstGeom prst="rect">
             <a:avLst/>

</xml_diff>